<commit_message>
ppt and todo list updated.
</commit_message>
<xml_diff>
--- a/asset/images/13, 56.pptx
+++ b/asset/images/13, 56.pptx
@@ -13,6 +13,10 @@
     <p:sldId id="261" r:id="rId7"/>
     <p:sldId id="262" r:id="rId8"/>
     <p:sldId id="263" r:id="rId9"/>
+    <p:sldId id="264" r:id="rId10"/>
+    <p:sldId id="265" r:id="rId11"/>
+    <p:sldId id="266" r:id="rId12"/>
+    <p:sldId id="267" r:id="rId13"/>
   </p:sldIdLst>
   <p:sldSz cx="9144000" cy="6858000" type="screen4x3"/>
   <p:notesSz cx="6858000" cy="9144000"/>
@@ -262,7 +266,7 @@
           <a:p>
             <a:fld id="{ADEC84FA-D6C7-482F-A1FA-0A32D277FA04}" type="datetimeFigureOut">
               <a:rPr lang="en-US" smtClean="0"/>
-              <a:t>7/17/2018</a:t>
+              <a:t>8/19/2018</a:t>
             </a:fld>
             <a:endParaRPr lang="en-US"/>
           </a:p>
@@ -561,7 +565,7 @@
           <a:p>
             <a:fld id="{ADEC84FA-D6C7-482F-A1FA-0A32D277FA04}" type="datetimeFigureOut">
               <a:rPr lang="en-US" smtClean="0"/>
-              <a:t>7/17/2018</a:t>
+              <a:t>8/19/2018</a:t>
             </a:fld>
             <a:endParaRPr lang="en-US"/>
           </a:p>
@@ -736,7 +740,7 @@
           <a:p>
             <a:fld id="{ADEC84FA-D6C7-482F-A1FA-0A32D277FA04}" type="datetimeFigureOut">
               <a:rPr lang="en-US" smtClean="0"/>
-              <a:t>7/17/2018</a:t>
+              <a:t>8/19/2018</a:t>
             </a:fld>
             <a:endParaRPr lang="en-US"/>
           </a:p>
@@ -901,7 +905,7 @@
           <a:p>
             <a:fld id="{ADEC84FA-D6C7-482F-A1FA-0A32D277FA04}" type="datetimeFigureOut">
               <a:rPr lang="en-US" smtClean="0"/>
-              <a:t>7/17/2018</a:t>
+              <a:t>8/19/2018</a:t>
             </a:fld>
             <a:endParaRPr lang="en-US"/>
           </a:p>
@@ -1161,7 +1165,7 @@
           <a:p>
             <a:fld id="{ADEC84FA-D6C7-482F-A1FA-0A32D277FA04}" type="datetimeFigureOut">
               <a:rPr lang="en-US" smtClean="0"/>
-              <a:t>7/17/2018</a:t>
+              <a:t>8/19/2018</a:t>
             </a:fld>
             <a:endParaRPr lang="en-US"/>
           </a:p>
@@ -1615,7 +1619,7 @@
           <a:p>
             <a:fld id="{ADEC84FA-D6C7-482F-A1FA-0A32D277FA04}" type="datetimeFigureOut">
               <a:rPr lang="en-US" smtClean="0"/>
-              <a:t>7/17/2018</a:t>
+              <a:t>8/19/2018</a:t>
             </a:fld>
             <a:endParaRPr lang="en-US"/>
           </a:p>
@@ -2098,7 +2102,7 @@
           <a:p>
             <a:fld id="{ADEC84FA-D6C7-482F-A1FA-0A32D277FA04}" type="datetimeFigureOut">
               <a:rPr lang="en-US" smtClean="0"/>
-              <a:t>7/17/2018</a:t>
+              <a:t>8/19/2018</a:t>
             </a:fld>
             <a:endParaRPr lang="en-US"/>
           </a:p>
@@ -2216,7 +2220,7 @@
           <a:p>
             <a:fld id="{ADEC84FA-D6C7-482F-A1FA-0A32D277FA04}" type="datetimeFigureOut">
               <a:rPr lang="en-US" smtClean="0"/>
-              <a:t>7/17/2018</a:t>
+              <a:t>8/19/2018</a:t>
             </a:fld>
             <a:endParaRPr lang="en-US"/>
           </a:p>
@@ -2352,7 +2356,7 @@
           <a:p>
             <a:fld id="{ADEC84FA-D6C7-482F-A1FA-0A32D277FA04}" type="datetimeFigureOut">
               <a:rPr lang="en-US" smtClean="0"/>
-              <a:t>7/17/2018</a:t>
+              <a:t>8/19/2018</a:t>
             </a:fld>
             <a:endParaRPr lang="en-US"/>
           </a:p>
@@ -2666,7 +2670,7 @@
           <a:p>
             <a:fld id="{ADEC84FA-D6C7-482F-A1FA-0A32D277FA04}" type="datetimeFigureOut">
               <a:rPr lang="en-US" smtClean="0"/>
-              <a:t>7/17/2018</a:t>
+              <a:t>8/19/2018</a:t>
             </a:fld>
             <a:endParaRPr lang="en-US"/>
           </a:p>
@@ -2794,7 +2798,7 @@
           <a:p>
             <a:fld id="{ADEC84FA-D6C7-482F-A1FA-0A32D277FA04}" type="datetimeFigureOut">
               <a:rPr lang="en-US" smtClean="0"/>
-              <a:t>7/17/2018</a:t>
+              <a:t>8/19/2018</a:t>
             </a:fld>
             <a:endParaRPr lang="en-US"/>
           </a:p>
@@ -3553,7 +3557,7 @@
           <a:p>
             <a:fld id="{ADEC84FA-D6C7-482F-A1FA-0A32D277FA04}" type="datetimeFigureOut">
               <a:rPr lang="en-US" smtClean="0"/>
-              <a:t>7/17/2018</a:t>
+              <a:t>8/19/2018</a:t>
             </a:fld>
             <a:endParaRPr lang="en-US"/>
           </a:p>
@@ -4099,11 +4103,7 @@
             <a:pPr algn="ctr"/>
             <a:r>
               <a:rPr lang="en-US" dirty="0" smtClean="0"/>
-              <a:t>Eco-friendly </a:t>
-            </a:r>
-            <a:r>
-              <a:rPr lang="en-US" dirty="0" smtClean="0"/>
-              <a:t>option for disposing e-Waste</a:t>
+              <a:t>Eco-friendly option for disposing e-Waste</a:t>
             </a:r>
             <a:endParaRPr lang="en-US" dirty="0"/>
           </a:p>
@@ -4238,18 +4238,7 @@
                   </a:schemeClr>
                 </a:solidFill>
               </a:rPr>
-              <a:t>56-Sachin </a:t>
-            </a:r>
-            <a:r>
-              <a:rPr lang="en-US" sz="2600" noProof="0" dirty="0" smtClean="0">
-                <a:solidFill>
-                  <a:schemeClr val="tx2">
-                    <a:shade val="30000"/>
-                    <a:satMod val="150000"/>
-                  </a:schemeClr>
-                </a:solidFill>
-              </a:rPr>
-              <a:t>Pal</a:t>
+              <a:t>56-Sachin Pal</a:t>
             </a:r>
             <a:endParaRPr kumimoji="0" lang="en-US" sz="2600" b="0" i="0" u="none" strike="noStrike" kern="1200" cap="none" spc="0" normalizeH="0" baseline="0" noProof="0" dirty="0">
               <a:ln>
@@ -4272,6 +4261,231 @@
         </p:txBody>
       </p:sp>
     </p:spTree>
+  </p:cSld>
+  <p:clrMapOvr>
+    <a:masterClrMapping/>
+  </p:clrMapOvr>
+</p:sld>
+</file>
+
+<file path=ppt/slides/slide10.xml><?xml version="1.0" encoding="utf-8"?>
+<p:sld xmlns:a="http://schemas.openxmlformats.org/drawingml/2006/main" xmlns:r="http://schemas.openxmlformats.org/officeDocument/2006/relationships" xmlns:p="http://schemas.openxmlformats.org/presentationml/2006/main">
+  <p:cSld>
+    <p:spTree>
+      <p:nvGrpSpPr>
+        <p:cNvPr id="1" name=""/>
+        <p:cNvGrpSpPr/>
+        <p:nvPr/>
+      </p:nvGrpSpPr>
+      <p:grpSpPr>
+        <a:xfrm>
+          <a:off x="0" y="0"/>
+          <a:ext cx="0" cy="0"/>
+          <a:chOff x="0" y="0"/>
+          <a:chExt cx="0" cy="0"/>
+        </a:xfrm>
+      </p:grpSpPr>
+      <p:sp>
+        <p:nvSpPr>
+          <p:cNvPr id="2" name="Title 1"/>
+          <p:cNvSpPr>
+            <a:spLocks noGrp="1"/>
+          </p:cNvSpPr>
+          <p:nvPr>
+            <p:ph type="title"/>
+          </p:nvPr>
+        </p:nvSpPr>
+        <p:spPr/>
+        <p:txBody>
+          <a:bodyPr/>
+          <a:lstStyle/>
+          <a:p>
+            <a:endParaRPr lang="en-IN"/>
+          </a:p>
+        </p:txBody>
+      </p:sp>
+      <p:pic>
+        <p:nvPicPr>
+          <p:cNvPr id="4" name="Content Placeholder 3"/>
+          <p:cNvPicPr>
+            <a:picLocks noGrp="1" noChangeAspect="1"/>
+          </p:cNvPicPr>
+          <p:nvPr>
+            <p:ph idx="1"/>
+          </p:nvPr>
+        </p:nvPicPr>
+        <p:blipFill>
+          <a:blip r:embed="rId2"/>
+          <a:stretch>
+            <a:fillRect/>
+          </a:stretch>
+        </p:blipFill>
+        <p:spPr>
+          <a:xfrm>
+            <a:off x="1467438" y="1447800"/>
+            <a:ext cx="7434674" cy="4800600"/>
+          </a:xfrm>
+          <a:prstGeom prst="rect">
+            <a:avLst/>
+          </a:prstGeom>
+        </p:spPr>
+      </p:pic>
+    </p:spTree>
+    <p:extLst>
+      <p:ext uri="{BB962C8B-B14F-4D97-AF65-F5344CB8AC3E}">
+        <p14:creationId xmlns:p14="http://schemas.microsoft.com/office/powerpoint/2010/main" val="3149463964"/>
+      </p:ext>
+    </p:extLst>
+  </p:cSld>
+  <p:clrMapOvr>
+    <a:masterClrMapping/>
+  </p:clrMapOvr>
+</p:sld>
+</file>
+
+<file path=ppt/slides/slide11.xml><?xml version="1.0" encoding="utf-8"?>
+<p:sld xmlns:a="http://schemas.openxmlformats.org/drawingml/2006/main" xmlns:r="http://schemas.openxmlformats.org/officeDocument/2006/relationships" xmlns:p="http://schemas.openxmlformats.org/presentationml/2006/main">
+  <p:cSld>
+    <p:spTree>
+      <p:nvGrpSpPr>
+        <p:cNvPr id="1" name=""/>
+        <p:cNvGrpSpPr/>
+        <p:nvPr/>
+      </p:nvGrpSpPr>
+      <p:grpSpPr>
+        <a:xfrm>
+          <a:off x="0" y="0"/>
+          <a:ext cx="0" cy="0"/>
+          <a:chOff x="0" y="0"/>
+          <a:chExt cx="0" cy="0"/>
+        </a:xfrm>
+      </p:grpSpPr>
+      <p:sp>
+        <p:nvSpPr>
+          <p:cNvPr id="2" name="Title 1"/>
+          <p:cNvSpPr>
+            <a:spLocks noGrp="1"/>
+          </p:cNvSpPr>
+          <p:nvPr>
+            <p:ph type="title"/>
+          </p:nvPr>
+        </p:nvSpPr>
+        <p:spPr/>
+        <p:txBody>
+          <a:bodyPr/>
+          <a:lstStyle/>
+          <a:p>
+            <a:endParaRPr lang="en-IN"/>
+          </a:p>
+        </p:txBody>
+      </p:sp>
+      <p:pic>
+        <p:nvPicPr>
+          <p:cNvPr id="4" name="Content Placeholder 3"/>
+          <p:cNvPicPr>
+            <a:picLocks noGrp="1" noChangeAspect="1"/>
+          </p:cNvPicPr>
+          <p:nvPr>
+            <p:ph idx="1"/>
+          </p:nvPr>
+        </p:nvPicPr>
+        <p:blipFill>
+          <a:blip r:embed="rId2"/>
+          <a:stretch>
+            <a:fillRect/>
+          </a:stretch>
+        </p:blipFill>
+        <p:spPr>
+          <a:xfrm>
+            <a:off x="1467438" y="1447800"/>
+            <a:ext cx="7434674" cy="4800600"/>
+          </a:xfrm>
+          <a:prstGeom prst="rect">
+            <a:avLst/>
+          </a:prstGeom>
+        </p:spPr>
+      </p:pic>
+    </p:spTree>
+    <p:extLst>
+      <p:ext uri="{BB962C8B-B14F-4D97-AF65-F5344CB8AC3E}">
+        <p14:creationId xmlns:p14="http://schemas.microsoft.com/office/powerpoint/2010/main" val="3084657422"/>
+      </p:ext>
+    </p:extLst>
+  </p:cSld>
+  <p:clrMapOvr>
+    <a:masterClrMapping/>
+  </p:clrMapOvr>
+</p:sld>
+</file>
+
+<file path=ppt/slides/slide12.xml><?xml version="1.0" encoding="utf-8"?>
+<p:sld xmlns:a="http://schemas.openxmlformats.org/drawingml/2006/main" xmlns:r="http://schemas.openxmlformats.org/officeDocument/2006/relationships" xmlns:p="http://schemas.openxmlformats.org/presentationml/2006/main">
+  <p:cSld>
+    <p:spTree>
+      <p:nvGrpSpPr>
+        <p:cNvPr id="1" name=""/>
+        <p:cNvGrpSpPr/>
+        <p:nvPr/>
+      </p:nvGrpSpPr>
+      <p:grpSpPr>
+        <a:xfrm>
+          <a:off x="0" y="0"/>
+          <a:ext cx="0" cy="0"/>
+          <a:chOff x="0" y="0"/>
+          <a:chExt cx="0" cy="0"/>
+        </a:xfrm>
+      </p:grpSpPr>
+      <p:sp>
+        <p:nvSpPr>
+          <p:cNvPr id="2" name="Title 1"/>
+          <p:cNvSpPr>
+            <a:spLocks noGrp="1"/>
+          </p:cNvSpPr>
+          <p:nvPr>
+            <p:ph type="title"/>
+          </p:nvPr>
+        </p:nvSpPr>
+        <p:spPr/>
+        <p:txBody>
+          <a:bodyPr/>
+          <a:lstStyle/>
+          <a:p>
+            <a:endParaRPr lang="en-IN"/>
+          </a:p>
+        </p:txBody>
+      </p:sp>
+      <p:pic>
+        <p:nvPicPr>
+          <p:cNvPr id="4" name="Content Placeholder 3"/>
+          <p:cNvPicPr>
+            <a:picLocks noGrp="1" noChangeAspect="1"/>
+          </p:cNvPicPr>
+          <p:nvPr>
+            <p:ph idx="1"/>
+          </p:nvPr>
+        </p:nvPicPr>
+        <p:blipFill>
+          <a:blip r:embed="rId2"/>
+          <a:stretch>
+            <a:fillRect/>
+          </a:stretch>
+        </p:blipFill>
+        <p:spPr>
+          <a:xfrm>
+            <a:off x="1467438" y="1447800"/>
+            <a:ext cx="7434674" cy="4800600"/>
+          </a:xfrm>
+          <a:prstGeom prst="rect">
+            <a:avLst/>
+          </a:prstGeom>
+        </p:spPr>
+      </p:pic>
+    </p:spTree>
+    <p:extLst>
+      <p:ext uri="{BB962C8B-B14F-4D97-AF65-F5344CB8AC3E}">
+        <p14:creationId xmlns:p14="http://schemas.microsoft.com/office/powerpoint/2010/main" val="63610194"/>
+      </p:ext>
+    </p:extLst>
   </p:cSld>
   <p:clrMapOvr>
     <a:masterClrMapping/>
@@ -4633,33 +4847,13 @@
           <a:p>
             <a:r>
               <a:rPr lang="en-US" dirty="0" smtClean="0"/>
-              <a:t>To help curb this e-waste generation problem we are </a:t>
-            </a:r>
+              <a:t>To help curb this e-waste generation problem we are creating a website which will help the e-waste to be disposed off properly.</a:t>
+            </a:r>
+          </a:p>
+          <a:p>
             <a:r>
               <a:rPr lang="en-US" dirty="0" smtClean="0"/>
-              <a:t>creating a website </a:t>
-            </a:r>
-            <a:r>
-              <a:rPr lang="en-US" dirty="0" smtClean="0"/>
-              <a:t>which will help the e-waste to be disposed off properly.</a:t>
-            </a:r>
-          </a:p>
-          <a:p>
-            <a:r>
-              <a:rPr lang="en-US" dirty="0" smtClean="0"/>
-              <a:t>Using this </a:t>
-            </a:r>
-            <a:r>
-              <a:rPr lang="en-US" dirty="0" smtClean="0"/>
-              <a:t>website</a:t>
-            </a:r>
-            <a:r>
-              <a:rPr lang="en-US" dirty="0" smtClean="0"/>
-              <a:t> </a:t>
-            </a:r>
-            <a:r>
-              <a:rPr lang="en-US" dirty="0" smtClean="0"/>
-              <a:t>the user can post different amount  of e-waste it has and can also generate money for the same.</a:t>
+              <a:t>Using this website the user can post different amount  of e-waste it has and can also generate money for the same.</a:t>
             </a:r>
             <a:endParaRPr lang="en-US" dirty="0"/>
           </a:p>
@@ -4995,19 +5189,7 @@
             </a:pPr>
             <a:r>
               <a:rPr lang="en-US" dirty="0" smtClean="0"/>
-              <a:t>Using this </a:t>
-            </a:r>
-            <a:r>
-              <a:rPr lang="en-US" dirty="0" smtClean="0"/>
-              <a:t>website</a:t>
-            </a:r>
-            <a:r>
-              <a:rPr lang="en-US" dirty="0" smtClean="0"/>
-              <a:t> </a:t>
-            </a:r>
-            <a:r>
-              <a:rPr lang="en-US" dirty="0" smtClean="0"/>
-              <a:t>the user can</a:t>
+              <a:t>Using this website the user can</a:t>
             </a:r>
           </a:p>
           <a:p>
@@ -5055,6 +5237,86 @@
         </p:txBody>
       </p:sp>
     </p:spTree>
+  </p:cSld>
+  <p:clrMapOvr>
+    <a:masterClrMapping/>
+  </p:clrMapOvr>
+</p:sld>
+</file>
+
+<file path=ppt/slides/slide9.xml><?xml version="1.0" encoding="utf-8"?>
+<p:sld xmlns:a="http://schemas.openxmlformats.org/drawingml/2006/main" xmlns:r="http://schemas.openxmlformats.org/officeDocument/2006/relationships" xmlns:p="http://schemas.openxmlformats.org/presentationml/2006/main">
+  <p:cSld>
+    <p:spTree>
+      <p:nvGrpSpPr>
+        <p:cNvPr id="1" name=""/>
+        <p:cNvGrpSpPr/>
+        <p:nvPr/>
+      </p:nvGrpSpPr>
+      <p:grpSpPr>
+        <a:xfrm>
+          <a:off x="0" y="0"/>
+          <a:ext cx="0" cy="0"/>
+          <a:chOff x="0" y="0"/>
+          <a:chExt cx="0" cy="0"/>
+        </a:xfrm>
+      </p:grpSpPr>
+      <p:sp>
+        <p:nvSpPr>
+          <p:cNvPr id="2" name="Title 1"/>
+          <p:cNvSpPr>
+            <a:spLocks noGrp="1"/>
+          </p:cNvSpPr>
+          <p:nvPr>
+            <p:ph type="title"/>
+          </p:nvPr>
+        </p:nvSpPr>
+        <p:spPr/>
+        <p:txBody>
+          <a:bodyPr/>
+          <a:lstStyle/>
+          <a:p>
+            <a:pPr algn="ctr"/>
+            <a:r>
+              <a:rPr lang="en-IN" dirty="0" smtClean="0"/>
+              <a:t>Screenshot</a:t>
+            </a:r>
+            <a:endParaRPr lang="en-IN" dirty="0"/>
+          </a:p>
+        </p:txBody>
+      </p:sp>
+      <p:pic>
+        <p:nvPicPr>
+          <p:cNvPr id="5" name="Content Placeholder 4"/>
+          <p:cNvPicPr>
+            <a:picLocks noGrp="1" noChangeAspect="1"/>
+          </p:cNvPicPr>
+          <p:nvPr>
+            <p:ph idx="1"/>
+          </p:nvPr>
+        </p:nvPicPr>
+        <p:blipFill>
+          <a:blip r:embed="rId2"/>
+          <a:stretch>
+            <a:fillRect/>
+          </a:stretch>
+        </p:blipFill>
+        <p:spPr>
+          <a:xfrm>
+            <a:off x="1435100" y="1849737"/>
+            <a:ext cx="7499350" cy="3996725"/>
+          </a:xfrm>
+          <a:prstGeom prst="rect">
+            <a:avLst/>
+          </a:prstGeom>
+        </p:spPr>
+      </p:pic>
+    </p:spTree>
+    <p:extLst>
+      <p:ext uri="{BB962C8B-B14F-4D97-AF65-F5344CB8AC3E}">
+        <p14:creationId xmlns:p14="http://schemas.microsoft.com/office/powerpoint/2010/main" val="307530842"/>
+      </p:ext>
+    </p:extLst>
   </p:cSld>
   <p:clrMapOvr>
     <a:masterClrMapping/>

</xml_diff>